<commit_message>
working on lab f
</commit_message>
<xml_diff>
--- a/content/04-os-command-line-interfaces.pptx
+++ b/content/04-os-command-line-interfaces.pptx
@@ -5,7 +5,7 @@
     <p:sldMasterId id="2147483696" r:id="rId1"/>
   </p:sldMasterIdLst>
   <p:notesMasterIdLst>
-    <p:notesMasterId r:id="rId27"/>
+    <p:notesMasterId r:id="rId26"/>
   </p:notesMasterIdLst>
   <p:sldIdLst>
     <p:sldId id="297" r:id="rId2"/>
@@ -30,9 +30,8 @@
     <p:sldId id="291" r:id="rId21"/>
     <p:sldId id="294" r:id="rId22"/>
     <p:sldId id="292" r:id="rId23"/>
-    <p:sldId id="295" r:id="rId24"/>
-    <p:sldId id="321" r:id="rId25"/>
-    <p:sldId id="283" r:id="rId26"/>
+    <p:sldId id="321" r:id="rId24"/>
+    <p:sldId id="283" r:id="rId25"/>
   </p:sldIdLst>
   <p:sldSz cx="12192000" cy="6858000"/>
   <p:notesSz cx="6858000" cy="9144000"/>
@@ -166,7 +165,6 @@
         <p14:section name="Wrap-Up" id="{250B09FA-E151-4F0D-B4D4-21A2DA6D2F7E}">
           <p14:sldIdLst>
             <p14:sldId id="292"/>
-            <p14:sldId id="295"/>
             <p14:sldId id="321"/>
             <p14:sldId id="283"/>
           </p14:sldIdLst>
@@ -1192,13 +1190,6 @@
         </dgm:presLayoutVars>
       </dgm:prSet>
       <dgm:spPr/>
-      <dgm:t>
-        <a:bodyPr/>
-        <a:lstStyle/>
-        <a:p>
-          <a:endParaRPr lang="en-US"/>
-        </a:p>
-      </dgm:t>
     </dgm:pt>
     <dgm:pt modelId="{527172BC-55CC-42E5-BCBD-FAA38C170B13}" type="pres">
       <dgm:prSet presAssocID="{0C6B232B-4C79-4AB4-B018-72A89D176634}" presName="parentLin" presStyleCnt="0"/>
@@ -1207,13 +1198,6 @@
     <dgm:pt modelId="{7389466E-4A65-42B9-B30E-B192B76575FF}" type="pres">
       <dgm:prSet presAssocID="{0C6B232B-4C79-4AB4-B018-72A89D176634}" presName="parentLeftMargin" presStyleLbl="node1" presStyleIdx="0" presStyleCnt="6"/>
       <dgm:spPr/>
-      <dgm:t>
-        <a:bodyPr/>
-        <a:lstStyle/>
-        <a:p>
-          <a:endParaRPr lang="en-US"/>
-        </a:p>
-      </dgm:t>
     </dgm:pt>
     <dgm:pt modelId="{45461E07-E8B7-401B-A827-699507942290}" type="pres">
       <dgm:prSet presAssocID="{0C6B232B-4C79-4AB4-B018-72A89D176634}" presName="parentText" presStyleLbl="node1" presStyleIdx="0" presStyleCnt="6">
@@ -1223,13 +1207,6 @@
         </dgm:presLayoutVars>
       </dgm:prSet>
       <dgm:spPr/>
-      <dgm:t>
-        <a:bodyPr/>
-        <a:lstStyle/>
-        <a:p>
-          <a:endParaRPr lang="en-US"/>
-        </a:p>
-      </dgm:t>
     </dgm:pt>
     <dgm:pt modelId="{EAE335A4-4F67-49D5-9516-37C413CAC5DC}" type="pres">
       <dgm:prSet presAssocID="{0C6B232B-4C79-4AB4-B018-72A89D176634}" presName="negativeSpace" presStyleCnt="0"/>
@@ -1254,13 +1231,6 @@
     <dgm:pt modelId="{0CADD586-C229-4A00-BAEC-0A0A8EC9DFBA}" type="pres">
       <dgm:prSet presAssocID="{4716A7DC-63C5-4D01-82D3-24BCC6475839}" presName="parentLeftMargin" presStyleLbl="node1" presStyleIdx="0" presStyleCnt="6"/>
       <dgm:spPr/>
-      <dgm:t>
-        <a:bodyPr/>
-        <a:lstStyle/>
-        <a:p>
-          <a:endParaRPr lang="en-US"/>
-        </a:p>
-      </dgm:t>
     </dgm:pt>
     <dgm:pt modelId="{7B503141-F9D5-4249-988A-271AA200BA4B}" type="pres">
       <dgm:prSet presAssocID="{4716A7DC-63C5-4D01-82D3-24BCC6475839}" presName="parentText" presStyleLbl="node1" presStyleIdx="1" presStyleCnt="6">
@@ -1270,13 +1240,6 @@
         </dgm:presLayoutVars>
       </dgm:prSet>
       <dgm:spPr/>
-      <dgm:t>
-        <a:bodyPr/>
-        <a:lstStyle/>
-        <a:p>
-          <a:endParaRPr lang="en-US"/>
-        </a:p>
-      </dgm:t>
     </dgm:pt>
     <dgm:pt modelId="{F02BCA59-7881-442D-B486-1E471850BBC6}" type="pres">
       <dgm:prSet presAssocID="{4716A7DC-63C5-4D01-82D3-24BCC6475839}" presName="negativeSpace" presStyleCnt="0"/>
@@ -1301,13 +1264,6 @@
     <dgm:pt modelId="{D9A6D485-D48B-4837-A436-F17DC29DB33E}" type="pres">
       <dgm:prSet presAssocID="{96357181-6160-4DE4-85B8-46F788C3E1D1}" presName="parentLeftMargin" presStyleLbl="node1" presStyleIdx="1" presStyleCnt="6"/>
       <dgm:spPr/>
-      <dgm:t>
-        <a:bodyPr/>
-        <a:lstStyle/>
-        <a:p>
-          <a:endParaRPr lang="en-US"/>
-        </a:p>
-      </dgm:t>
     </dgm:pt>
     <dgm:pt modelId="{57CE8033-88DE-40BC-AF00-D4280CC63820}" type="pres">
       <dgm:prSet presAssocID="{96357181-6160-4DE4-85B8-46F788C3E1D1}" presName="parentText" presStyleLbl="node1" presStyleIdx="2" presStyleCnt="6">
@@ -1317,13 +1273,6 @@
         </dgm:presLayoutVars>
       </dgm:prSet>
       <dgm:spPr/>
-      <dgm:t>
-        <a:bodyPr/>
-        <a:lstStyle/>
-        <a:p>
-          <a:endParaRPr lang="en-US"/>
-        </a:p>
-      </dgm:t>
     </dgm:pt>
     <dgm:pt modelId="{66E6918F-D0C1-4101-826B-29F11F21DAD4}" type="pres">
       <dgm:prSet presAssocID="{96357181-6160-4DE4-85B8-46F788C3E1D1}" presName="negativeSpace" presStyleCnt="0"/>
@@ -1336,13 +1285,6 @@
         </dgm:presLayoutVars>
       </dgm:prSet>
       <dgm:spPr/>
-      <dgm:t>
-        <a:bodyPr/>
-        <a:lstStyle/>
-        <a:p>
-          <a:endParaRPr lang="en-US"/>
-        </a:p>
-      </dgm:t>
     </dgm:pt>
     <dgm:pt modelId="{231EB0C1-8509-4BE6-AC69-792D7DDA9C3A}" type="pres">
       <dgm:prSet presAssocID="{5DFC190F-1B44-4BF4-8276-C58B3FE83358}" presName="spaceBetweenRectangles" presStyleCnt="0"/>
@@ -1355,13 +1297,6 @@
     <dgm:pt modelId="{FED3FFAD-4AF5-4BFE-B3A9-64CF542DE598}" type="pres">
       <dgm:prSet presAssocID="{35031DD2-FDD0-4DAE-9042-204020DA0247}" presName="parentLeftMargin" presStyleLbl="node1" presStyleIdx="2" presStyleCnt="6"/>
       <dgm:spPr/>
-      <dgm:t>
-        <a:bodyPr/>
-        <a:lstStyle/>
-        <a:p>
-          <a:endParaRPr lang="en-US"/>
-        </a:p>
-      </dgm:t>
     </dgm:pt>
     <dgm:pt modelId="{674888BA-5CB6-48FD-8B79-AC70CBB28859}" type="pres">
       <dgm:prSet presAssocID="{35031DD2-FDD0-4DAE-9042-204020DA0247}" presName="parentText" presStyleLbl="node1" presStyleIdx="3" presStyleCnt="6">
@@ -1371,13 +1306,6 @@
         </dgm:presLayoutVars>
       </dgm:prSet>
       <dgm:spPr/>
-      <dgm:t>
-        <a:bodyPr/>
-        <a:lstStyle/>
-        <a:p>
-          <a:endParaRPr lang="en-US"/>
-        </a:p>
-      </dgm:t>
     </dgm:pt>
     <dgm:pt modelId="{1C8FA55B-66D8-4BE8-93A9-B45C657A4478}" type="pres">
       <dgm:prSet presAssocID="{35031DD2-FDD0-4DAE-9042-204020DA0247}" presName="negativeSpace" presStyleCnt="0"/>
@@ -1402,13 +1330,6 @@
     <dgm:pt modelId="{EFB99048-2704-496B-BB36-E55037AC3ABF}" type="pres">
       <dgm:prSet presAssocID="{32D0127E-81A7-40A2-92D8-6533BB6F94D0}" presName="parentLeftMargin" presStyleLbl="node1" presStyleIdx="3" presStyleCnt="6"/>
       <dgm:spPr/>
-      <dgm:t>
-        <a:bodyPr/>
-        <a:lstStyle/>
-        <a:p>
-          <a:endParaRPr lang="en-US"/>
-        </a:p>
-      </dgm:t>
     </dgm:pt>
     <dgm:pt modelId="{E2FD6336-ED1F-4433-AB59-0CEBBD0DF1FF}" type="pres">
       <dgm:prSet presAssocID="{32D0127E-81A7-40A2-92D8-6533BB6F94D0}" presName="parentText" presStyleLbl="node1" presStyleIdx="4" presStyleCnt="6">
@@ -1418,13 +1339,6 @@
         </dgm:presLayoutVars>
       </dgm:prSet>
       <dgm:spPr/>
-      <dgm:t>
-        <a:bodyPr/>
-        <a:lstStyle/>
-        <a:p>
-          <a:endParaRPr lang="en-US"/>
-        </a:p>
-      </dgm:t>
     </dgm:pt>
     <dgm:pt modelId="{FC86FB0A-7F20-4340-B3A6-93E3D6B95CA6}" type="pres">
       <dgm:prSet presAssocID="{32D0127E-81A7-40A2-92D8-6533BB6F94D0}" presName="negativeSpace" presStyleCnt="0"/>
@@ -1449,13 +1363,6 @@
     <dgm:pt modelId="{D296FECC-D127-468B-9265-1DBA9131ACA9}" type="pres">
       <dgm:prSet presAssocID="{E909B2CD-F811-4DFE-8EDA-87C630884AC5}" presName="parentLeftMargin" presStyleLbl="node1" presStyleIdx="4" presStyleCnt="6"/>
       <dgm:spPr/>
-      <dgm:t>
-        <a:bodyPr/>
-        <a:lstStyle/>
-        <a:p>
-          <a:endParaRPr lang="en-US"/>
-        </a:p>
-      </dgm:t>
     </dgm:pt>
     <dgm:pt modelId="{765AF105-741C-4535-B652-08EEC39A39C7}" type="pres">
       <dgm:prSet presAssocID="{E909B2CD-F811-4DFE-8EDA-87C630884AC5}" presName="parentText" presStyleLbl="node1" presStyleIdx="5" presStyleCnt="6">
@@ -1465,13 +1372,6 @@
         </dgm:presLayoutVars>
       </dgm:prSet>
       <dgm:spPr/>
-      <dgm:t>
-        <a:bodyPr/>
-        <a:lstStyle/>
-        <a:p>
-          <a:endParaRPr lang="en-US"/>
-        </a:p>
-      </dgm:t>
     </dgm:pt>
     <dgm:pt modelId="{70D10793-AA09-4942-BCE1-DF7DDDE31350}" type="pres">
       <dgm:prSet presAssocID="{E909B2CD-F811-4DFE-8EDA-87C630884AC5}" presName="negativeSpace" presStyleCnt="0"/>
@@ -1487,27 +1387,27 @@
     </dgm:pt>
   </dgm:ptLst>
   <dgm:cxnLst>
-    <dgm:cxn modelId="{1E0815FA-2049-499D-A078-FBBCE59EDAA4}" type="presOf" srcId="{E909B2CD-F811-4DFE-8EDA-87C630884AC5}" destId="{D296FECC-D127-468B-9265-1DBA9131ACA9}" srcOrd="0" destOrd="0" presId="urn:microsoft.com/office/officeart/2005/8/layout/list1"/>
-    <dgm:cxn modelId="{968B6CE8-B10A-4F3D-9712-01767B20607A}" type="presOf" srcId="{35031DD2-FDD0-4DAE-9042-204020DA0247}" destId="{FED3FFAD-4AF5-4BFE-B3A9-64CF542DE598}" srcOrd="0" destOrd="0" presId="urn:microsoft.com/office/officeart/2005/8/layout/list1"/>
-    <dgm:cxn modelId="{01F5926C-B638-41EE-AD25-92469568E7E2}" srcId="{122BC740-6901-4DA0-B21B-63BA97CDAB0E}" destId="{35031DD2-FDD0-4DAE-9042-204020DA0247}" srcOrd="3" destOrd="0" parTransId="{B7486A14-1398-4715-B0AC-7F5BD4642AF8}" sibTransId="{825D9934-C43F-4709-92A4-3D29E780E744}"/>
-    <dgm:cxn modelId="{4B60ACC1-6853-4D85-8C68-F5260C910642}" type="presOf" srcId="{122BC740-6901-4DA0-B21B-63BA97CDAB0E}" destId="{876311F8-FE09-4D88-B753-50377512E4E7}" srcOrd="0" destOrd="0" presId="urn:microsoft.com/office/officeart/2005/8/layout/list1"/>
-    <dgm:cxn modelId="{D1066096-866A-4005-A38C-0FD047592872}" type="presOf" srcId="{0C6B232B-4C79-4AB4-B018-72A89D176634}" destId="{45461E07-E8B7-401B-A827-699507942290}" srcOrd="1" destOrd="0" presId="urn:microsoft.com/office/officeart/2005/8/layout/list1"/>
     <dgm:cxn modelId="{194B741D-0B50-4547-93E4-C93300B505CE}" srcId="{96357181-6160-4DE4-85B8-46F788C3E1D1}" destId="{B67A090B-0813-4D55-B00B-EFA458E78608}" srcOrd="0" destOrd="0" parTransId="{F51A0CBA-FECA-4946-99D5-459A48342B25}" sibTransId="{1C8D7C04-CEF3-4201-8120-E34257CBF1F2}"/>
     <dgm:cxn modelId="{21FDF31F-1C00-44AE-AF19-8180CF6195CF}" srcId="{122BC740-6901-4DA0-B21B-63BA97CDAB0E}" destId="{96357181-6160-4DE4-85B8-46F788C3E1D1}" srcOrd="2" destOrd="0" parTransId="{A862ED1B-0A4B-46EF-A0F2-FDDAB5259051}" sibTransId="{5DFC190F-1B44-4BF4-8276-C58B3FE83358}"/>
+    <dgm:cxn modelId="{9C8AA824-C9FC-49E2-B664-EEE178A79BE3}" srcId="{122BC740-6901-4DA0-B21B-63BA97CDAB0E}" destId="{0C6B232B-4C79-4AB4-B018-72A89D176634}" srcOrd="0" destOrd="0" parTransId="{7F44EB70-EC4C-417E-B48D-3F98DAD5D581}" sibTransId="{9D53FF5B-228E-4F3F-8F36-93DB4794F0BF}"/>
+    <dgm:cxn modelId="{B5FCAE29-0BFB-467E-BD9B-01DC3413EE0A}" type="presOf" srcId="{4716A7DC-63C5-4D01-82D3-24BCC6475839}" destId="{0CADD586-C229-4A00-BAEC-0A0A8EC9DFBA}" srcOrd="0" destOrd="0" presId="urn:microsoft.com/office/officeart/2005/8/layout/list1"/>
+    <dgm:cxn modelId="{5A437D42-70EC-42DF-B51D-DB23FA9C7640}" type="presOf" srcId="{4716A7DC-63C5-4D01-82D3-24BCC6475839}" destId="{7B503141-F9D5-4249-988A-271AA200BA4B}" srcOrd="1" destOrd="0" presId="urn:microsoft.com/office/officeart/2005/8/layout/list1"/>
+    <dgm:cxn modelId="{9BD6B16A-04C5-4A4A-AF44-6DBEB0373D61}" type="presOf" srcId="{32D0127E-81A7-40A2-92D8-6533BB6F94D0}" destId="{EFB99048-2704-496B-BB36-E55037AC3ABF}" srcOrd="0" destOrd="0" presId="urn:microsoft.com/office/officeart/2005/8/layout/list1"/>
+    <dgm:cxn modelId="{01F5926C-B638-41EE-AD25-92469568E7E2}" srcId="{122BC740-6901-4DA0-B21B-63BA97CDAB0E}" destId="{35031DD2-FDD0-4DAE-9042-204020DA0247}" srcOrd="3" destOrd="0" parTransId="{B7486A14-1398-4715-B0AC-7F5BD4642AF8}" sibTransId="{825D9934-C43F-4709-92A4-3D29E780E744}"/>
+    <dgm:cxn modelId="{9D0C6081-2202-408B-A6DD-4591BEB43983}" type="presOf" srcId="{35031DD2-FDD0-4DAE-9042-204020DA0247}" destId="{674888BA-5CB6-48FD-8B79-AC70CBB28859}" srcOrd="1" destOrd="0" presId="urn:microsoft.com/office/officeart/2005/8/layout/list1"/>
+    <dgm:cxn modelId="{16540588-3A07-45AB-8C44-CC27CBC5F874}" srcId="{122BC740-6901-4DA0-B21B-63BA97CDAB0E}" destId="{4716A7DC-63C5-4D01-82D3-24BCC6475839}" srcOrd="1" destOrd="0" parTransId="{C152E22F-175F-40AA-9254-071539B44B36}" sibTransId="{E93109A8-CB12-4A31-8A1A-5CDE475D9CFB}"/>
+    <dgm:cxn modelId="{C1484788-609D-4744-B0ED-0A07E1E69AA1}" type="presOf" srcId="{96357181-6160-4DE4-85B8-46F788C3E1D1}" destId="{57CE8033-88DE-40BC-AF00-D4280CC63820}" srcOrd="1" destOrd="0" presId="urn:microsoft.com/office/officeart/2005/8/layout/list1"/>
+    <dgm:cxn modelId="{69C2A88F-D294-4E5B-9EF4-8863200CD655}" srcId="{122BC740-6901-4DA0-B21B-63BA97CDAB0E}" destId="{32D0127E-81A7-40A2-92D8-6533BB6F94D0}" srcOrd="4" destOrd="0" parTransId="{58C4D87A-DB7E-4D61-A9FE-B1A78C1B727A}" sibTransId="{08315DC0-E551-4AB8-B2AF-8BAE5E0F2A91}"/>
     <dgm:cxn modelId="{B34D1A92-DB34-4699-BAA6-3D2348C70207}" type="presOf" srcId="{E909B2CD-F811-4DFE-8EDA-87C630884AC5}" destId="{765AF105-741C-4535-B652-08EEC39A39C7}" srcOrd="1" destOrd="0" presId="urn:microsoft.com/office/officeart/2005/8/layout/list1"/>
-    <dgm:cxn modelId="{9BD6B16A-04C5-4A4A-AF44-6DBEB0373D61}" type="presOf" srcId="{32D0127E-81A7-40A2-92D8-6533BB6F94D0}" destId="{EFB99048-2704-496B-BB36-E55037AC3ABF}" srcOrd="0" destOrd="0" presId="urn:microsoft.com/office/officeart/2005/8/layout/list1"/>
-    <dgm:cxn modelId="{B5FCAE29-0BFB-467E-BD9B-01DC3413EE0A}" type="presOf" srcId="{4716A7DC-63C5-4D01-82D3-24BCC6475839}" destId="{0CADD586-C229-4A00-BAEC-0A0A8EC9DFBA}" srcOrd="0" destOrd="0" presId="urn:microsoft.com/office/officeart/2005/8/layout/list1"/>
-    <dgm:cxn modelId="{16540588-3A07-45AB-8C44-CC27CBC5F874}" srcId="{122BC740-6901-4DA0-B21B-63BA97CDAB0E}" destId="{4716A7DC-63C5-4D01-82D3-24BCC6475839}" srcOrd="1" destOrd="0" parTransId="{C152E22F-175F-40AA-9254-071539B44B36}" sibTransId="{E93109A8-CB12-4A31-8A1A-5CDE475D9CFB}"/>
-    <dgm:cxn modelId="{DCE3B5FC-532E-4E6E-85E8-38B21CB285D2}" type="presOf" srcId="{32D0127E-81A7-40A2-92D8-6533BB6F94D0}" destId="{E2FD6336-ED1F-4433-AB59-0CEBBD0DF1FF}" srcOrd="1" destOrd="0" presId="urn:microsoft.com/office/officeart/2005/8/layout/list1"/>
-    <dgm:cxn modelId="{9C8AA824-C9FC-49E2-B664-EEE178A79BE3}" srcId="{122BC740-6901-4DA0-B21B-63BA97CDAB0E}" destId="{0C6B232B-4C79-4AB4-B018-72A89D176634}" srcOrd="0" destOrd="0" parTransId="{7F44EB70-EC4C-417E-B48D-3F98DAD5D581}" sibTransId="{9D53FF5B-228E-4F3F-8F36-93DB4794F0BF}"/>
-    <dgm:cxn modelId="{51704BE4-E7D4-412D-9E8D-D7CD4AACCEED}" type="presOf" srcId="{0C6B232B-4C79-4AB4-B018-72A89D176634}" destId="{7389466E-4A65-42B9-B30E-B192B76575FF}" srcOrd="0" destOrd="0" presId="urn:microsoft.com/office/officeart/2005/8/layout/list1"/>
-    <dgm:cxn modelId="{C1484788-609D-4744-B0ED-0A07E1E69AA1}" type="presOf" srcId="{96357181-6160-4DE4-85B8-46F788C3E1D1}" destId="{57CE8033-88DE-40BC-AF00-D4280CC63820}" srcOrd="1" destOrd="0" presId="urn:microsoft.com/office/officeart/2005/8/layout/list1"/>
-    <dgm:cxn modelId="{B1C32CDF-5C3E-4154-832A-907F32B0A8DD}" type="presOf" srcId="{96357181-6160-4DE4-85B8-46F788C3E1D1}" destId="{D9A6D485-D48B-4837-A436-F17DC29DB33E}" srcOrd="0" destOrd="0" presId="urn:microsoft.com/office/officeart/2005/8/layout/list1"/>
-    <dgm:cxn modelId="{9D0C6081-2202-408B-A6DD-4591BEB43983}" type="presOf" srcId="{35031DD2-FDD0-4DAE-9042-204020DA0247}" destId="{674888BA-5CB6-48FD-8B79-AC70CBB28859}" srcOrd="1" destOrd="0" presId="urn:microsoft.com/office/officeart/2005/8/layout/list1"/>
-    <dgm:cxn modelId="{69C2A88F-D294-4E5B-9EF4-8863200CD655}" srcId="{122BC740-6901-4DA0-B21B-63BA97CDAB0E}" destId="{32D0127E-81A7-40A2-92D8-6533BB6F94D0}" srcOrd="4" destOrd="0" parTransId="{58C4D87A-DB7E-4D61-A9FE-B1A78C1B727A}" sibTransId="{08315DC0-E551-4AB8-B2AF-8BAE5E0F2A91}"/>
+    <dgm:cxn modelId="{D1066096-866A-4005-A38C-0FD047592872}" type="presOf" srcId="{0C6B232B-4C79-4AB4-B018-72A89D176634}" destId="{45461E07-E8B7-401B-A827-699507942290}" srcOrd="1" destOrd="0" presId="urn:microsoft.com/office/officeart/2005/8/layout/list1"/>
+    <dgm:cxn modelId="{4B60ACC1-6853-4D85-8C68-F5260C910642}" type="presOf" srcId="{122BC740-6901-4DA0-B21B-63BA97CDAB0E}" destId="{876311F8-FE09-4D88-B753-50377512E4E7}" srcOrd="0" destOrd="0" presId="urn:microsoft.com/office/officeart/2005/8/layout/list1"/>
     <dgm:cxn modelId="{5BE391D5-C2FB-4295-89D7-69446DC9074F}" srcId="{122BC740-6901-4DA0-B21B-63BA97CDAB0E}" destId="{E909B2CD-F811-4DFE-8EDA-87C630884AC5}" srcOrd="5" destOrd="0" parTransId="{F17DE27E-5B2C-4C4C-8290-830C0D34C492}" sibTransId="{09A87860-FA3D-49CF-86A0-64557A2B2EB0}"/>
     <dgm:cxn modelId="{1865AFD6-4FE8-4C56-B672-EB61B2817C38}" type="presOf" srcId="{B67A090B-0813-4D55-B00B-EFA458E78608}" destId="{8E707D3D-5548-4900-9915-EB71C548B3DE}" srcOrd="0" destOrd="0" presId="urn:microsoft.com/office/officeart/2005/8/layout/list1"/>
-    <dgm:cxn modelId="{5A437D42-70EC-42DF-B51D-DB23FA9C7640}" type="presOf" srcId="{4716A7DC-63C5-4D01-82D3-24BCC6475839}" destId="{7B503141-F9D5-4249-988A-271AA200BA4B}" srcOrd="1" destOrd="0" presId="urn:microsoft.com/office/officeart/2005/8/layout/list1"/>
+    <dgm:cxn modelId="{B1C32CDF-5C3E-4154-832A-907F32B0A8DD}" type="presOf" srcId="{96357181-6160-4DE4-85B8-46F788C3E1D1}" destId="{D9A6D485-D48B-4837-A436-F17DC29DB33E}" srcOrd="0" destOrd="0" presId="urn:microsoft.com/office/officeart/2005/8/layout/list1"/>
+    <dgm:cxn modelId="{51704BE4-E7D4-412D-9E8D-D7CD4AACCEED}" type="presOf" srcId="{0C6B232B-4C79-4AB4-B018-72A89D176634}" destId="{7389466E-4A65-42B9-B30E-B192B76575FF}" srcOrd="0" destOrd="0" presId="urn:microsoft.com/office/officeart/2005/8/layout/list1"/>
+    <dgm:cxn modelId="{968B6CE8-B10A-4F3D-9712-01767B20607A}" type="presOf" srcId="{35031DD2-FDD0-4DAE-9042-204020DA0247}" destId="{FED3FFAD-4AF5-4BFE-B3A9-64CF542DE598}" srcOrd="0" destOrd="0" presId="urn:microsoft.com/office/officeart/2005/8/layout/list1"/>
+    <dgm:cxn modelId="{1E0815FA-2049-499D-A078-FBBCE59EDAA4}" type="presOf" srcId="{E909B2CD-F811-4DFE-8EDA-87C630884AC5}" destId="{D296FECC-D127-468B-9265-1DBA9131ACA9}" srcOrd="0" destOrd="0" presId="urn:microsoft.com/office/officeart/2005/8/layout/list1"/>
+    <dgm:cxn modelId="{DCE3B5FC-532E-4E6E-85E8-38B21CB285D2}" type="presOf" srcId="{32D0127E-81A7-40A2-92D8-6533BB6F94D0}" destId="{E2FD6336-ED1F-4433-AB59-0CEBBD0DF1FF}" srcOrd="1" destOrd="0" presId="urn:microsoft.com/office/officeart/2005/8/layout/list1"/>
     <dgm:cxn modelId="{53E9AE37-09EB-47C5-B74C-4B11DE4A447E}" type="presParOf" srcId="{876311F8-FE09-4D88-B753-50377512E4E7}" destId="{527172BC-55CC-42E5-BCBD-FAA38C170B13}" srcOrd="0" destOrd="0" presId="urn:microsoft.com/office/officeart/2005/8/layout/list1"/>
     <dgm:cxn modelId="{B5972625-2402-4336-B4CB-974778D99E30}" type="presParOf" srcId="{527172BC-55CC-42E5-BCBD-FAA38C170B13}" destId="{7389466E-4A65-42B9-B30E-B192B76575FF}" srcOrd="0" destOrd="0" presId="urn:microsoft.com/office/officeart/2005/8/layout/list1"/>
     <dgm:cxn modelId="{1BB5A7B5-9D20-42F1-B596-D6C560E5C511}" type="presParOf" srcId="{527172BC-55CC-42E5-BCBD-FAA38C170B13}" destId="{45461E07-E8B7-401B-A827-699507942290}" srcOrd="1" destOrd="0" presId="urn:microsoft.com/office/officeart/2005/8/layout/list1"/>
@@ -1666,7 +1566,7 @@
         </a:bodyPr>
         <a:lstStyle/>
         <a:p>
-          <a:pPr lvl="0" algn="l" defTabSz="844550">
+          <a:pPr marL="0" lvl="0" indent="0" algn="l" defTabSz="844550">
             <a:lnSpc>
               <a:spcPct val="90000"/>
             </a:lnSpc>
@@ -1676,6 +1576,7 @@
             <a:spcAft>
               <a:spcPct val="35000"/>
             </a:spcAft>
+            <a:buNone/>
           </a:pPr>
           <a:r>
             <a:rPr lang="en-US" sz="1900" kern="1200"/>
@@ -1792,7 +1693,7 @@
         </a:bodyPr>
         <a:lstStyle/>
         <a:p>
-          <a:pPr lvl="0" algn="l" defTabSz="844550">
+          <a:pPr marL="0" lvl="0" indent="0" algn="l" defTabSz="844550">
             <a:lnSpc>
               <a:spcPct val="90000"/>
             </a:lnSpc>
@@ -1802,6 +1703,7 @@
             <a:spcAft>
               <a:spcPct val="35000"/>
             </a:spcAft>
+            <a:buNone/>
           </a:pPr>
           <a:r>
             <a:rPr lang="en-US" sz="1900" kern="1200"/>
@@ -1878,7 +1780,7 @@
             <a:spcAft>
               <a:spcPct val="15000"/>
             </a:spcAft>
-            <a:buChar char="••"/>
+            <a:buChar char="•"/>
           </a:pPr>
           <a:r>
             <a:rPr lang="en-US" sz="1900" kern="1200"/>
@@ -1946,7 +1848,7 @@
         </a:bodyPr>
         <a:lstStyle/>
         <a:p>
-          <a:pPr lvl="0" algn="l" defTabSz="844550">
+          <a:pPr marL="0" lvl="0" indent="0" algn="l" defTabSz="844550">
             <a:lnSpc>
               <a:spcPct val="90000"/>
             </a:lnSpc>
@@ -1956,6 +1858,7 @@
             <a:spcAft>
               <a:spcPct val="35000"/>
             </a:spcAft>
+            <a:buNone/>
           </a:pPr>
           <a:r>
             <a:rPr lang="en-US" sz="1900" kern="1200"/>
@@ -2072,7 +1975,7 @@
         </a:bodyPr>
         <a:lstStyle/>
         <a:p>
-          <a:pPr lvl="0" algn="l" defTabSz="844550">
+          <a:pPr marL="0" lvl="0" indent="0" algn="l" defTabSz="844550">
             <a:lnSpc>
               <a:spcPct val="90000"/>
             </a:lnSpc>
@@ -2082,6 +1985,7 @@
             <a:spcAft>
               <a:spcPct val="35000"/>
             </a:spcAft>
+            <a:buNone/>
           </a:pPr>
           <a:r>
             <a:rPr lang="en-US" sz="1900" kern="1200"/>
@@ -2198,7 +2102,7 @@
         </a:bodyPr>
         <a:lstStyle/>
         <a:p>
-          <a:pPr lvl="0" algn="l" defTabSz="844550">
+          <a:pPr marL="0" lvl="0" indent="0" algn="l" defTabSz="844550">
             <a:lnSpc>
               <a:spcPct val="90000"/>
             </a:lnSpc>
@@ -2208,6 +2112,7 @@
             <a:spcAft>
               <a:spcPct val="35000"/>
             </a:spcAft>
+            <a:buNone/>
           </a:pPr>
           <a:r>
             <a:rPr lang="en-US" sz="1900" kern="1200" dirty="0"/>
@@ -2324,7 +2229,7 @@
         </a:bodyPr>
         <a:lstStyle/>
         <a:p>
-          <a:pPr lvl="0" algn="l" defTabSz="844550">
+          <a:pPr marL="0" lvl="0" indent="0" algn="l" defTabSz="844550">
             <a:lnSpc>
               <a:spcPct val="90000"/>
             </a:lnSpc>
@@ -2334,6 +2239,7 @@
             <a:spcAft>
               <a:spcPct val="35000"/>
             </a:spcAft>
+            <a:buNone/>
           </a:pPr>
           <a:r>
             <a:rPr lang="en-US" sz="1900" kern="1200" dirty="0" err="1"/>
@@ -3695,7 +3601,7 @@
           <a:p>
             <a:fld id="{7BCB8214-0E7E-4EFC-9E1C-25F6159D4170}" type="datetimeFigureOut">
               <a:rPr lang="en-US" smtClean="0"/>
-              <a:t>8/28/2018</a:t>
+              <a:t>9/11/2018</a:t>
             </a:fld>
             <a:endParaRPr lang="en-US"/>
           </a:p>
@@ -4008,18 +3914,14 @@
           <a:p>
             <a:r>
               <a:rPr lang="en-US" dirty="0"/>
-              <a:t>Give students 1-2 minutes for each question. Its important to provide them  with the opportunity to answer the questions based on the reading, labs, and assigned homework</a:t>
-            </a:r>
-            <a:r>
-              <a:rPr lang="en-US" dirty="0" smtClean="0"/>
-              <a:t>.</a:t>
-            </a:r>
-          </a:p>
-          <a:p>
-            <a:endParaRPr lang="en-US" dirty="0" smtClean="0"/>
-          </a:p>
-          <a:p>
-            <a:endParaRPr lang="en-US" dirty="0" smtClean="0"/>
+              <a:t>Give students 1-2 minutes for each question. Its important to provide them  with the opportunity to answer the questions based on the reading, labs, and assigned homework.</a:t>
+            </a:r>
+          </a:p>
+          <a:p>
+            <a:endParaRPr lang="en-US" dirty="0"/>
+          </a:p>
+          <a:p>
+            <a:endParaRPr lang="en-US" dirty="0"/>
           </a:p>
           <a:p>
             <a:endParaRPr lang="en-US" dirty="0"/>
@@ -4382,14 +4284,14 @@
               <a:defRPr/>
             </a:pPr>
             <a:r>
-              <a:rPr lang="en-US" dirty="0" smtClean="0"/>
+              <a:rPr lang="en-US" dirty="0"/>
               <a:t>Go over the lab questions. With the students. Ask</a:t>
             </a:r>
             <a:r>
-              <a:rPr lang="en-US" baseline="0" dirty="0" smtClean="0"/>
+              <a:rPr lang="en-US" baseline="0" dirty="0"/>
               <a:t> them to take out their answers to the lab questions. And their questions about the lab itself.</a:t>
             </a:r>
-            <a:endParaRPr lang="en-US" dirty="0" smtClean="0"/>
+            <a:endParaRPr lang="en-US" dirty="0"/>
           </a:p>
           <a:p>
             <a:endParaRPr lang="en-US" dirty="0"/>
@@ -5326,7 +5228,7 @@
           <a:p>
             <a:fld id="{C8AC65AB-5746-43EA-A59E-648FB11CA309}" type="datetimeFigureOut">
               <a:rPr lang="en-US" smtClean="0"/>
-              <a:t>8/28/2018</a:t>
+              <a:t>9/11/2018</a:t>
             </a:fld>
             <a:endParaRPr lang="en-US"/>
           </a:p>
@@ -5496,7 +5398,7 @@
           <a:p>
             <a:fld id="{C8AC65AB-5746-43EA-A59E-648FB11CA309}" type="datetimeFigureOut">
               <a:rPr lang="en-US" smtClean="0"/>
-              <a:t>8/28/2018</a:t>
+              <a:t>9/11/2018</a:t>
             </a:fld>
             <a:endParaRPr lang="en-US"/>
           </a:p>
@@ -5676,7 +5578,7 @@
           <a:p>
             <a:fld id="{C8AC65AB-5746-43EA-A59E-648FB11CA309}" type="datetimeFigureOut">
               <a:rPr lang="en-US" smtClean="0"/>
-              <a:t>8/28/2018</a:t>
+              <a:t>9/11/2018</a:t>
             </a:fld>
             <a:endParaRPr lang="en-US"/>
           </a:p>
@@ -5868,7 +5770,7 @@
           <a:p>
             <a:fld id="{C8AC65AB-5746-43EA-A59E-648FB11CA309}" type="datetimeFigureOut">
               <a:rPr lang="en-US" smtClean="0"/>
-              <a:t>8/28/2018</a:t>
+              <a:t>9/11/2018</a:t>
             </a:fld>
             <a:endParaRPr lang="en-US"/>
           </a:p>
@@ -6113,7 +6015,7 @@
           <a:p>
             <a:fld id="{C8AC65AB-5746-43EA-A59E-648FB11CA309}" type="datetimeFigureOut">
               <a:rPr lang="en-US" smtClean="0"/>
-              <a:t>8/28/2018</a:t>
+              <a:t>9/11/2018</a:t>
             </a:fld>
             <a:endParaRPr lang="en-US"/>
           </a:p>
@@ -6350,7 +6252,7 @@
           <a:p>
             <a:fld id="{C8AC65AB-5746-43EA-A59E-648FB11CA309}" type="datetimeFigureOut">
               <a:rPr lang="en-US" smtClean="0"/>
-              <a:t>8/28/2018</a:t>
+              <a:t>9/11/2018</a:t>
             </a:fld>
             <a:endParaRPr lang="en-US"/>
           </a:p>
@@ -6726,7 +6628,7 @@
           <a:p>
             <a:fld id="{C8AC65AB-5746-43EA-A59E-648FB11CA309}" type="datetimeFigureOut">
               <a:rPr lang="en-US" smtClean="0"/>
-              <a:t>8/28/2018</a:t>
+              <a:t>9/11/2018</a:t>
             </a:fld>
             <a:endParaRPr lang="en-US"/>
           </a:p>
@@ -6849,7 +6751,7 @@
           <a:p>
             <a:fld id="{C8AC65AB-5746-43EA-A59E-648FB11CA309}" type="datetimeFigureOut">
               <a:rPr lang="en-US" smtClean="0"/>
-              <a:t>8/28/2018</a:t>
+              <a:t>9/11/2018</a:t>
             </a:fld>
             <a:endParaRPr lang="en-US"/>
           </a:p>
@@ -6944,7 +6846,7 @@
           <a:p>
             <a:fld id="{C8AC65AB-5746-43EA-A59E-648FB11CA309}" type="datetimeFigureOut">
               <a:rPr lang="en-US" smtClean="0"/>
-              <a:t>8/28/2018</a:t>
+              <a:t>9/11/2018</a:t>
             </a:fld>
             <a:endParaRPr lang="en-US"/>
           </a:p>
@@ -7221,7 +7123,7 @@
           <a:p>
             <a:fld id="{C8AC65AB-5746-43EA-A59E-648FB11CA309}" type="datetimeFigureOut">
               <a:rPr lang="en-US" smtClean="0"/>
-              <a:t>8/28/2018</a:t>
+              <a:t>9/11/2018</a:t>
             </a:fld>
             <a:endParaRPr lang="en-US"/>
           </a:p>
@@ -7478,7 +7380,7 @@
           <a:p>
             <a:fld id="{C8AC65AB-5746-43EA-A59E-648FB11CA309}" type="datetimeFigureOut">
               <a:rPr lang="en-US" smtClean="0"/>
-              <a:t>8/28/2018</a:t>
+              <a:t>9/11/2018</a:t>
             </a:fld>
             <a:endParaRPr lang="en-US"/>
           </a:p>
@@ -7691,7 +7593,7 @@
           <a:p>
             <a:fld id="{C8AC65AB-5746-43EA-A59E-648FB11CA309}" type="datetimeFigureOut">
               <a:rPr lang="en-US" smtClean="0"/>
-              <a:t>8/28/2018</a:t>
+              <a:t>9/11/2018</a:t>
             </a:fld>
             <a:endParaRPr lang="en-US"/>
           </a:p>
@@ -8112,7 +8014,7 @@
                 <a16:creationId xmlns:a16="http://schemas.microsoft.com/office/drawing/2014/main" id="{6753252F-4873-4F63-801D-CC719279A7D5}"/>
               </a:ext>
               <a:ext uri="{C183D7F6-B498-43B3-948B-1728B52AA6E4}">
-                <adec:decorative xmlns="" xmlns:adec="http://schemas.microsoft.com/office/drawing/2017/decorative" val="1"/>
+                <adec:decorative xmlns:adec="http://schemas.microsoft.com/office/drawing/2017/decorative" val="1"/>
               </a:ext>
             </a:extLst>
           </p:cNvPr>
@@ -8204,7 +8106,7 @@
                 <a16:creationId xmlns:a16="http://schemas.microsoft.com/office/drawing/2014/main" id="{047C8CCB-F95D-4249-92DD-651249D3535A}"/>
               </a:ext>
               <a:ext uri="{C183D7F6-B498-43B3-948B-1728B52AA6E4}">
-                <adec:decorative xmlns="" xmlns:adec="http://schemas.microsoft.com/office/drawing/2017/decorative" val="1"/>
+                <adec:decorative xmlns:adec="http://schemas.microsoft.com/office/drawing/2017/decorative" val="1"/>
               </a:ext>
             </a:extLst>
           </p:cNvPr>
@@ -8339,14 +8241,6 @@
               </a:rPr>
               <a:t>IST346: </a:t>
             </a:r>
-            <a:r>
-              <a:rPr lang="en-US" sz="2600" dirty="0">
-                <a:solidFill>
-                  <a:srgbClr val="FFFFFF"/>
-                </a:solidFill>
-              </a:rPr>
-              <a:t/>
-            </a:r>
             <a:br>
               <a:rPr lang="en-US" sz="2600" dirty="0">
                 <a:solidFill>
@@ -8361,14 +8255,6 @@
                 </a:solidFill>
               </a:rPr>
               <a:t>Operating Systems / Command Line</a:t>
-            </a:r>
-            <a:r>
-              <a:rPr lang="en-US" sz="2600">
-                <a:solidFill>
-                  <a:srgbClr val="FFFFFF"/>
-                </a:solidFill>
-              </a:rPr>
-              <a:t/>
             </a:r>
             <a:br>
               <a:rPr lang="en-US" sz="2600">
@@ -8713,7 +8599,7 @@
                 <a14:useLocalDpi xmlns:a14="http://schemas.microsoft.com/office/drawing/2010/main" val="0"/>
               </a:ext>
               <a:ext uri="{96DAC541-7B7A-43D3-8B79-37D633B846F1}">
-                <asvg:svgBlip xmlns="" xmlns:asvg="http://schemas.microsoft.com/office/drawing/2016/SVG/main" r:embed="rId4"/>
+                <asvg:svgBlip xmlns:asvg="http://schemas.microsoft.com/office/drawing/2016/SVG/main" r:embed="rId4"/>
               </a:ext>
             </a:extLst>
           </a:blip>
@@ -9093,7 +8979,7 @@
                 <a16:creationId xmlns:a16="http://schemas.microsoft.com/office/drawing/2014/main" id="{08E89D5E-1885-4160-AC77-CC471DD1D0DB}"/>
               </a:ext>
               <a:ext uri="{C183D7F6-B498-43B3-948B-1728B52AA6E4}">
-                <adec:decorative xmlns="" xmlns:adec="http://schemas.microsoft.com/office/drawing/2017/decorative" val="1"/>
+                <adec:decorative xmlns:adec="http://schemas.microsoft.com/office/drawing/2017/decorative" val="1"/>
               </a:ext>
             </a:extLst>
           </p:cNvPr>
@@ -9192,7 +9078,7 @@
                 <a16:creationId xmlns:a16="http://schemas.microsoft.com/office/drawing/2014/main" id="{550D2BD1-98F9-412D-905B-3A843EF4078B}"/>
               </a:ext>
               <a:ext uri="{C183D7F6-B498-43B3-948B-1728B52AA6E4}">
-                <adec:decorative xmlns="" xmlns:adec="http://schemas.microsoft.com/office/drawing/2017/decorative" val="1"/>
+                <adec:decorative xmlns:adec="http://schemas.microsoft.com/office/drawing/2017/decorative" val="1"/>
               </a:ext>
             </a:extLst>
           </p:cNvPr>
@@ -9524,7 +9410,7 @@
                 <a14:useLocalDpi xmlns:a14="http://schemas.microsoft.com/office/drawing/2010/main" val="0"/>
               </a:ext>
               <a:ext uri="{96DAC541-7B7A-43D3-8B79-37D633B846F1}">
-                <asvg:svgBlip xmlns="" xmlns:asvg="http://schemas.microsoft.com/office/drawing/2016/SVG/main" r:embed="rId4"/>
+                <asvg:svgBlip xmlns:asvg="http://schemas.microsoft.com/office/drawing/2016/SVG/main" r:embed="rId4"/>
               </a:ext>
             </a:extLst>
           </a:blip>
@@ -9550,7 +9436,7 @@
                 <a16:creationId xmlns:a16="http://schemas.microsoft.com/office/drawing/2014/main" id="{C6B4BC7B-6554-49E1-85BC-638C0D148CBD}"/>
               </a:ext>
               <a:ext uri="{C183D7F6-B498-43B3-948B-1728B52AA6E4}">
-                <adec:decorative xmlns="" xmlns:adec="http://schemas.microsoft.com/office/drawing/2017/decorative" val="1"/>
+                <adec:decorative xmlns:adec="http://schemas.microsoft.com/office/drawing/2017/decorative" val="1"/>
               </a:ext>
             </a:extLst>
           </p:cNvPr>
@@ -9573,7 +9459,7 @@
                 <a14:useLocalDpi xmlns:a14="http://schemas.microsoft.com/office/drawing/2010/main" val="0"/>
               </a:ext>
               <a:ext uri="{96DAC541-7B7A-43D3-8B79-37D633B846F1}">
-                <asvg:svgBlip xmlns="" xmlns:asvg="http://schemas.microsoft.com/office/drawing/2016/SVG/main" r:embed="rId4"/>
+                <asvg:svgBlip xmlns:asvg="http://schemas.microsoft.com/office/drawing/2016/SVG/main" r:embed="rId4"/>
               </a:ext>
             </a:extLst>
           </a:blip>
@@ -9642,7 +9528,7 @@
                 <a14:useLocalDpi xmlns:a14="http://schemas.microsoft.com/office/drawing/2010/main" val="0"/>
               </a:ext>
               <a:ext uri="{96DAC541-7B7A-43D3-8B79-37D633B846F1}">
-                <asvg:svgBlip xmlns="" xmlns:asvg="http://schemas.microsoft.com/office/drawing/2016/SVG/main" r:embed="rId4"/>
+                <asvg:svgBlip xmlns:asvg="http://schemas.microsoft.com/office/drawing/2016/SVG/main" r:embed="rId4"/>
               </a:ext>
             </a:extLst>
           </a:blip>
@@ -10075,7 +9961,7 @@
                 <a14:useLocalDpi xmlns:a14="http://schemas.microsoft.com/office/drawing/2010/main" val="0"/>
               </a:ext>
               <a:ext uri="{96DAC541-7B7A-43D3-8B79-37D633B846F1}">
-                <asvg:svgBlip xmlns="" xmlns:asvg="http://schemas.microsoft.com/office/drawing/2016/SVG/main" r:embed="rId3"/>
+                <asvg:svgBlip xmlns:asvg="http://schemas.microsoft.com/office/drawing/2016/SVG/main" r:embed="rId3"/>
               </a:ext>
             </a:extLst>
           </a:blip>
@@ -10170,10 +10056,9 @@
           <a:p>
             <a:pPr lvl="1"/>
             <a:r>
-              <a:rPr lang="en-US" dirty="0" smtClean="0"/>
+              <a:rPr lang="en-US" dirty="0"/>
               <a:t>Computer concepts, </a:t>
             </a:r>
-            <a:endParaRPr lang="en-US" dirty="0"/>
           </a:p>
           <a:p>
             <a:pPr lvl="1"/>
@@ -10191,7 +10076,7 @@
           </a:p>
           <a:p>
             <a:r>
-              <a:rPr lang="en-US" smtClean="0"/>
+              <a:rPr lang="en-US"/>
               <a:t>Wrap-Up</a:t>
             </a:r>
             <a:endParaRPr lang="en-US" dirty="0"/>
@@ -10244,7 +10129,7 @@
                 <a16:creationId xmlns:a16="http://schemas.microsoft.com/office/drawing/2014/main" id="{C66F2F30-5DC0-44A0-BFA6-E12F46ED16DA}"/>
               </a:ext>
               <a:ext uri="{C183D7F6-B498-43B3-948B-1728B52AA6E4}">
-                <adec:decorative xmlns="" xmlns:adec="http://schemas.microsoft.com/office/drawing/2017/decorative" val="1"/>
+                <adec:decorative xmlns:adec="http://schemas.microsoft.com/office/drawing/2017/decorative" val="1"/>
               </a:ext>
             </a:extLst>
           </p:cNvPr>
@@ -10368,7 +10253,7 @@
                 <a16:creationId xmlns:a16="http://schemas.microsoft.com/office/drawing/2014/main" id="{85872F57-7F42-4F97-8391-DDC8D0054C03}"/>
               </a:ext>
               <a:ext uri="{C183D7F6-B498-43B3-948B-1728B52AA6E4}">
-                <adec:decorative xmlns="" xmlns:adec="http://schemas.microsoft.com/office/drawing/2017/decorative" val="1"/>
+                <adec:decorative xmlns:adec="http://schemas.microsoft.com/office/drawing/2017/decorative" val="1"/>
               </a:ext>
             </a:extLst>
           </p:cNvPr>
@@ -10524,7 +10409,7 @@
                 <a16:creationId xmlns:a16="http://schemas.microsoft.com/office/drawing/2014/main" id="{04DC2037-48A0-4F22-B9D4-8EAEBC780AB4}"/>
               </a:ext>
               <a:ext uri="{C183D7F6-B498-43B3-948B-1728B52AA6E4}">
-                <adec:decorative xmlns="" xmlns:adec="http://schemas.microsoft.com/office/drawing/2017/decorative" val="1"/>
+                <adec:decorative xmlns:adec="http://schemas.microsoft.com/office/drawing/2017/decorative" val="1"/>
               </a:ext>
             </a:extLst>
           </p:cNvPr>
@@ -10629,7 +10514,7 @@
                 <a16:creationId xmlns:a16="http://schemas.microsoft.com/office/drawing/2014/main" id="{0006CBFD-ADA0-43D1-9332-9C34CA1C76ED}"/>
               </a:ext>
               <a:ext uri="{C183D7F6-B498-43B3-948B-1728B52AA6E4}">
-                <adec:decorative xmlns="" xmlns:adec="http://schemas.microsoft.com/office/drawing/2017/decorative" val="1"/>
+                <adec:decorative xmlns:adec="http://schemas.microsoft.com/office/drawing/2017/decorative" val="1"/>
               </a:ext>
             </a:extLst>
           </p:cNvPr>
@@ -10737,7 +10622,7 @@
                 <a16:creationId xmlns:a16="http://schemas.microsoft.com/office/drawing/2014/main" id="{2B931666-F28F-45F3-A074-66D2272D580B}"/>
               </a:ext>
               <a:ext uri="{C183D7F6-B498-43B3-948B-1728B52AA6E4}">
-                <adec:decorative xmlns="" xmlns:adec="http://schemas.microsoft.com/office/drawing/2017/decorative" val="1"/>
+                <adec:decorative xmlns:adec="http://schemas.microsoft.com/office/drawing/2017/decorative" val="1"/>
               </a:ext>
             </a:extLst>
           </p:cNvPr>
@@ -11141,7 +11026,7 @@
                 <a14:useLocalDpi xmlns:a14="http://schemas.microsoft.com/office/drawing/2010/main" val="0"/>
               </a:ext>
               <a:ext uri="{96DAC541-7B7A-43D3-8B79-37D633B846F1}">
-                <asvg:svgBlip xmlns="" xmlns:asvg="http://schemas.microsoft.com/office/drawing/2016/SVG/main" r:embed="rId4"/>
+                <asvg:svgBlip xmlns:asvg="http://schemas.microsoft.com/office/drawing/2016/SVG/main" r:embed="rId4"/>
               </a:ext>
             </a:extLst>
           </a:blip>
@@ -11167,7 +11052,7 @@
                 <a16:creationId xmlns:a16="http://schemas.microsoft.com/office/drawing/2014/main" id="{1A882A9F-F4E9-4E23-8F0B-20B5DF42EAA9}"/>
               </a:ext>
               <a:ext uri="{C183D7F6-B498-43B3-948B-1728B52AA6E4}">
-                <adec:decorative xmlns="" xmlns:adec="http://schemas.microsoft.com/office/drawing/2017/decorative" val="1"/>
+                <adec:decorative xmlns:adec="http://schemas.microsoft.com/office/drawing/2017/decorative" val="1"/>
               </a:ext>
             </a:extLst>
           </p:cNvPr>
@@ -11261,7 +11146,7 @@
                 <a16:creationId xmlns:a16="http://schemas.microsoft.com/office/drawing/2014/main" id="{FBE9F90C-C163-435B-9A68-D15C92D1CF2B}"/>
               </a:ext>
               <a:ext uri="{C183D7F6-B498-43B3-948B-1728B52AA6E4}">
-                <adec:decorative xmlns="" xmlns:adec="http://schemas.microsoft.com/office/drawing/2017/decorative" val="1"/>
+                <adec:decorative xmlns:adec="http://schemas.microsoft.com/office/drawing/2017/decorative" val="1"/>
               </a:ext>
             </a:extLst>
           </p:cNvPr>
@@ -11355,7 +11240,7 @@
                 <a16:creationId xmlns:a16="http://schemas.microsoft.com/office/drawing/2014/main" id="{CDA1A2E9-63FE-408D-A803-8E306ECAB4B3}"/>
               </a:ext>
               <a:ext uri="{C183D7F6-B498-43B3-948B-1728B52AA6E4}">
-                <adec:decorative xmlns="" xmlns:adec="http://schemas.microsoft.com/office/drawing/2017/decorative" val="1"/>
+                <adec:decorative xmlns:adec="http://schemas.microsoft.com/office/drawing/2017/decorative" val="1"/>
               </a:ext>
             </a:extLst>
           </p:cNvPr>
@@ -11590,122 +11475,6 @@
 <file path=ppt/slides/slide23.xml><?xml version="1.0" encoding="utf-8"?>
 <p:sld xmlns:a="http://schemas.openxmlformats.org/drawingml/2006/main" xmlns:r="http://schemas.openxmlformats.org/officeDocument/2006/relationships" xmlns:p="http://schemas.openxmlformats.org/presentationml/2006/main">
   <p:cSld>
-    <p:spTree>
-      <p:nvGrpSpPr>
-        <p:cNvPr id="1" name=""/>
-        <p:cNvGrpSpPr/>
-        <p:nvPr/>
-      </p:nvGrpSpPr>
-      <p:grpSpPr>
-        <a:xfrm>
-          <a:off x="0" y="0"/>
-          <a:ext cx="0" cy="0"/>
-          <a:chOff x="0" y="0"/>
-          <a:chExt cx="0" cy="0"/>
-        </a:xfrm>
-      </p:grpSpPr>
-      <p:sp>
-        <p:nvSpPr>
-          <p:cNvPr id="2" name="Title 1">
-            <a:extLst>
-              <a:ext uri="{FF2B5EF4-FFF2-40B4-BE49-F238E27FC236}">
-                <a16:creationId xmlns:a16="http://schemas.microsoft.com/office/drawing/2014/main" id="{CECEC0A2-0FBC-4FD8-99C8-5BE017C081E6}"/>
-              </a:ext>
-            </a:extLst>
-          </p:cNvPr>
-          <p:cNvSpPr>
-            <a:spLocks noGrp="1"/>
-          </p:cNvSpPr>
-          <p:nvPr>
-            <p:ph type="title"/>
-          </p:nvPr>
-        </p:nvSpPr>
-        <p:spPr/>
-        <p:txBody>
-          <a:bodyPr>
-            <a:normAutofit/>
-          </a:bodyPr>
-          <a:lstStyle/>
-          <a:p>
-            <a:r>
-              <a:rPr lang="en-US" sz="4800" dirty="0"/>
-              <a:t>Your To-Do List For Next Class</a:t>
-            </a:r>
-          </a:p>
-        </p:txBody>
-      </p:sp>
-      <p:sp>
-        <p:nvSpPr>
-          <p:cNvPr id="3" name="Content Placeholder 2">
-            <a:extLst>
-              <a:ext uri="{FF2B5EF4-FFF2-40B4-BE49-F238E27FC236}">
-                <a16:creationId xmlns:a16="http://schemas.microsoft.com/office/drawing/2014/main" id="{A0CE4E65-3524-408A-B9CE-20BAEBFA1991}"/>
-              </a:ext>
-            </a:extLst>
-          </p:cNvPr>
-          <p:cNvSpPr>
-            <a:spLocks noGrp="1"/>
-          </p:cNvSpPr>
-          <p:nvPr>
-            <p:ph idx="1"/>
-          </p:nvPr>
-        </p:nvSpPr>
-        <p:spPr/>
-        <p:txBody>
-          <a:bodyPr>
-            <a:normAutofit/>
-          </a:bodyPr>
-          <a:lstStyle/>
-          <a:p>
-            <a:r>
-              <a:rPr lang="en-US" sz="3200" dirty="0"/>
-              <a:t>Read (XX – Lesson Name)</a:t>
-            </a:r>
-          </a:p>
-          <a:p>
-            <a:pPr lvl="1"/>
-            <a:r>
-              <a:rPr lang="en-US" dirty="0"/>
-              <a:t>Reading Something</a:t>
-            </a:r>
-          </a:p>
-          <a:p>
-            <a:r>
-              <a:rPr lang="en-US" dirty="0"/>
-              <a:t>Homework:</a:t>
-            </a:r>
-          </a:p>
-          <a:p>
-            <a:pPr lvl="1"/>
-            <a:r>
-              <a:rPr lang="en-US" dirty="0"/>
-              <a:t>Lab something / homework something</a:t>
-            </a:r>
-          </a:p>
-          <a:p>
-            <a:pPr marL="457200" lvl="1" indent="0">
-              <a:buNone/>
-            </a:pPr>
-            <a:endParaRPr lang="en-US" dirty="0"/>
-          </a:p>
-        </p:txBody>
-      </p:sp>
-    </p:spTree>
-    <p:extLst>
-      <p:ext uri="{BB962C8B-B14F-4D97-AF65-F5344CB8AC3E}">
-        <p14:creationId xmlns:p14="http://schemas.microsoft.com/office/powerpoint/2010/main" val="1060460596"/>
-      </p:ext>
-    </p:extLst>
-  </p:cSld>
-  <p:clrMapOvr>
-    <a:masterClrMapping/>
-  </p:clrMapOvr>
-</p:sld>
-</file>
-
-<file path=ppt/slides/slide24.xml><?xml version="1.0" encoding="utf-8"?>
-<p:sld xmlns:a="http://schemas.openxmlformats.org/drawingml/2006/main" xmlns:r="http://schemas.openxmlformats.org/officeDocument/2006/relationships" xmlns:p="http://schemas.openxmlformats.org/presentationml/2006/main">
-  <p:cSld>
     <p:bg>
       <p:bgPr>
         <a:solidFill>
@@ -11736,7 +11505,7 @@
                 <a16:creationId xmlns:a16="http://schemas.microsoft.com/office/drawing/2014/main" id="{025E15EC-F3C2-49B3-B38B-7404B833B21C}"/>
               </a:ext>
               <a:ext uri="{C183D7F6-B498-43B3-948B-1728B52AA6E4}">
-                <adec:decorative xmlns="" xmlns:adec="http://schemas.microsoft.com/office/drawing/2017/decorative" val="1"/>
+                <adec:decorative xmlns:adec="http://schemas.microsoft.com/office/drawing/2017/decorative" val="1"/>
               </a:ext>
             </a:extLst>
           </p:cNvPr>
@@ -11759,7 +11528,7 @@
                 <a14:useLocalDpi xmlns:a14="http://schemas.microsoft.com/office/drawing/2010/main" val="0"/>
               </a:ext>
               <a:ext uri="{96DAC541-7B7A-43D3-8B79-37D633B846F1}">
-                <asvg:svgBlip xmlns="" xmlns:asvg="http://schemas.microsoft.com/office/drawing/2016/SVG/main" r:embed="rId3"/>
+                <asvg:svgBlip xmlns:asvg="http://schemas.microsoft.com/office/drawing/2016/SVG/main" r:embed="rId3"/>
               </a:ext>
             </a:extLst>
           </a:blip>
@@ -11798,7 +11567,7 @@
                 <a14:useLocalDpi xmlns:a14="http://schemas.microsoft.com/office/drawing/2010/main" val="0"/>
               </a:ext>
               <a:ext uri="{96DAC541-7B7A-43D3-8B79-37D633B846F1}">
-                <asvg:svgBlip xmlns="" xmlns:asvg="http://schemas.microsoft.com/office/drawing/2016/SVG/main" r:embed="rId3"/>
+                <asvg:svgBlip xmlns:asvg="http://schemas.microsoft.com/office/drawing/2016/SVG/main" r:embed="rId3"/>
               </a:ext>
             </a:extLst>
           </a:blip>
@@ -11916,7 +11685,7 @@
 </p:sld>
 </file>
 
-<file path=ppt/slides/slide25.xml><?xml version="1.0" encoding="utf-8"?>
+<file path=ppt/slides/slide24.xml><?xml version="1.0" encoding="utf-8"?>
 <p:sld xmlns:a="http://schemas.openxmlformats.org/drawingml/2006/main" xmlns:r="http://schemas.openxmlformats.org/officeDocument/2006/relationships" xmlns:p="http://schemas.openxmlformats.org/presentationml/2006/main">
   <p:cSld>
     <p:bg>
@@ -11962,7 +11731,7 @@
                 <a14:useLocalDpi xmlns:a14="http://schemas.microsoft.com/office/drawing/2010/main" val="0"/>
               </a:ext>
               <a:ext uri="{96DAC541-7B7A-43D3-8B79-37D633B846F1}">
-                <asvg:svgBlip xmlns="" xmlns:asvg="http://schemas.microsoft.com/office/drawing/2016/SVG/main" r:embed="rId3"/>
+                <asvg:svgBlip xmlns:asvg="http://schemas.microsoft.com/office/drawing/2016/SVG/main" r:embed="rId3"/>
               </a:ext>
             </a:extLst>
           </a:blip>
@@ -11988,7 +11757,7 @@
                 <a16:creationId xmlns:a16="http://schemas.microsoft.com/office/drawing/2014/main" id="{1A882A9F-F4E9-4E23-8F0B-20B5DF42EAA9}"/>
               </a:ext>
               <a:ext uri="{C183D7F6-B498-43B3-948B-1728B52AA6E4}">
-                <adec:decorative xmlns="" xmlns:adec="http://schemas.microsoft.com/office/drawing/2017/decorative" val="1"/>
+                <adec:decorative xmlns:adec="http://schemas.microsoft.com/office/drawing/2017/decorative" val="1"/>
               </a:ext>
             </a:extLst>
           </p:cNvPr>
@@ -12082,7 +11851,7 @@
                 <a16:creationId xmlns:a16="http://schemas.microsoft.com/office/drawing/2014/main" id="{FBE9F90C-C163-435B-9A68-D15C92D1CF2B}"/>
               </a:ext>
               <a:ext uri="{C183D7F6-B498-43B3-948B-1728B52AA6E4}">
-                <adec:decorative xmlns="" xmlns:adec="http://schemas.microsoft.com/office/drawing/2017/decorative" val="1"/>
+                <adec:decorative xmlns:adec="http://schemas.microsoft.com/office/drawing/2017/decorative" val="1"/>
               </a:ext>
             </a:extLst>
           </p:cNvPr>
@@ -12176,7 +11945,7 @@
                 <a16:creationId xmlns:a16="http://schemas.microsoft.com/office/drawing/2014/main" id="{CDA1A2E9-63FE-408D-A803-8E306ECAB4B3}"/>
               </a:ext>
               <a:ext uri="{C183D7F6-B498-43B3-948B-1728B52AA6E4}">
-                <adec:decorative xmlns="" xmlns:adec="http://schemas.microsoft.com/office/drawing/2017/decorative" val="1"/>
+                <adec:decorative xmlns:adec="http://schemas.microsoft.com/office/drawing/2017/decorative" val="1"/>
               </a:ext>
             </a:extLst>
           </p:cNvPr>
@@ -12389,7 +12158,7 @@
                 <a16:creationId xmlns:a16="http://schemas.microsoft.com/office/drawing/2014/main" id="{F98ED85F-DCEE-4B50-802E-71A6E3E12B04}"/>
               </a:ext>
               <a:ext uri="{C183D7F6-B498-43B3-948B-1728B52AA6E4}">
-                <adec:decorative xmlns="" xmlns:adec="http://schemas.microsoft.com/office/drawing/2017/decorative" val="1"/>
+                <adec:decorative xmlns:adec="http://schemas.microsoft.com/office/drawing/2017/decorative" val="1"/>
               </a:ext>
             </a:extLst>
           </p:cNvPr>
@@ -12520,7 +12289,7 @@
               <a:buAutoNum type="arabicPeriod"/>
             </a:pPr>
             <a:r>
-              <a:rPr lang="en-US" dirty="0" smtClean="0"/>
+              <a:rPr lang="en-US" dirty="0"/>
               <a:t>What are the 4 key tasks common to all computers?</a:t>
             </a:r>
           </a:p>
@@ -12530,7 +12299,7 @@
               <a:buAutoNum type="arabicPeriod"/>
             </a:pPr>
             <a:r>
-              <a:rPr lang="en-US" dirty="0" smtClean="0"/>
+              <a:rPr lang="en-US" dirty="0"/>
               <a:t>What is the universal format of data on a computer?</a:t>
             </a:r>
           </a:p>
@@ -12540,10 +12309,9 @@
               <a:buAutoNum type="arabicPeriod"/>
             </a:pPr>
             <a:r>
-              <a:rPr lang="en-US" dirty="0" smtClean="0"/>
+              <a:rPr lang="en-US" dirty="0"/>
               <a:t>What is an operating system?</a:t>
             </a:r>
-            <a:endParaRPr lang="en-US" dirty="0"/>
           </a:p>
           <a:p>
             <a:pPr marL="514350" lvl="0" indent="-514350">
@@ -12551,10 +12319,9 @@
               <a:buAutoNum type="arabicPeriod"/>
             </a:pPr>
             <a:r>
-              <a:rPr lang="en-US" dirty="0" smtClean="0"/>
+              <a:rPr lang="en-US" dirty="0"/>
               <a:t>What are the 5 responsibilities of the operating systems kernel?</a:t>
             </a:r>
-            <a:endParaRPr lang="en-US" dirty="0"/>
           </a:p>
           <a:p>
             <a:pPr marL="514350" lvl="0" indent="-514350">
@@ -12562,10 +12329,9 @@
               <a:buAutoNum type="arabicPeriod"/>
             </a:pPr>
             <a:r>
-              <a:rPr lang="en-US" dirty="0" smtClean="0"/>
+              <a:rPr lang="en-US" dirty="0"/>
               <a:t>What are the two common user interfaces found in an operating system? What are the advantages of each? </a:t>
             </a:r>
-            <a:endParaRPr lang="en-US" dirty="0"/>
           </a:p>
           <a:p>
             <a:pPr marL="514350" lvl="0" indent="-514350">
@@ -12674,10 +12440,9 @@
               <a:buAutoNum type="arabicPeriod"/>
             </a:pPr>
             <a:r>
-              <a:rPr lang="en-US" dirty="0" smtClean="0"/>
+              <a:rPr lang="en-US" dirty="0"/>
               <a:t>Let’s check how you did with your ROI/TCO homework.</a:t>
             </a:r>
-            <a:endParaRPr lang="en-US" dirty="0"/>
           </a:p>
         </p:txBody>
       </p:sp>
@@ -12739,10 +12504,9 @@
           <a:lstStyle/>
           <a:p>
             <a:r>
-              <a:rPr lang="en-US" sz="7200" dirty="0" smtClean="0"/>
+              <a:rPr lang="en-US" sz="7200" dirty="0"/>
               <a:t>Lab Debrief</a:t>
             </a:r>
-            <a:endParaRPr lang="en-US" sz="7200" dirty="0"/>
           </a:p>
         </p:txBody>
       </p:sp>
@@ -12764,14 +12528,9 @@
           <a:lstStyle/>
           <a:p>
             <a:r>
-              <a:rPr lang="en-US" sz="3600" dirty="0" smtClean="0"/>
-              <a:t>Lab - </a:t>
-            </a:r>
-            <a:r>
-              <a:rPr lang="en-US" sz="3600" dirty="0" smtClean="0"/>
-              <a:t>B</a:t>
-            </a:r>
-            <a:endParaRPr lang="en-US" sz="3600" dirty="0"/>
+              <a:rPr lang="en-US" sz="3600" dirty="0"/>
+              <a:t>Lab - B</a:t>
+            </a:r>
           </a:p>
         </p:txBody>
       </p:sp>
@@ -12845,7 +12604,7 @@
                 <a16:creationId xmlns:a16="http://schemas.microsoft.com/office/drawing/2014/main" id="{8D70B121-56F4-4848-B38B-182089D909FA}"/>
               </a:ext>
               <a:ext uri="{C183D7F6-B498-43B3-948B-1728B52AA6E4}">
-                <adec:decorative xmlns="" xmlns:adec="http://schemas.microsoft.com/office/drawing/2017/decorative" val="1"/>
+                <adec:decorative xmlns:adec="http://schemas.microsoft.com/office/drawing/2017/decorative" val="1"/>
               </a:ext>
             </a:extLst>
           </p:cNvPr>
@@ -12950,7 +12709,7 @@
                 <a16:creationId xmlns:a16="http://schemas.microsoft.com/office/drawing/2014/main" id="{2D72A2C9-F3CA-4216-8BAD-FA4C970C3C4E}"/>
               </a:ext>
               <a:ext uri="{C183D7F6-B498-43B3-948B-1728B52AA6E4}">
-                <adec:decorative xmlns="" xmlns:adec="http://schemas.microsoft.com/office/drawing/2017/decorative" val="1"/>
+                <adec:decorative xmlns:adec="http://schemas.microsoft.com/office/drawing/2017/decorative" val="1"/>
               </a:ext>
             </a:extLst>
           </p:cNvPr>
@@ -13130,7 +12889,7 @@
                 <a16:creationId xmlns:a16="http://schemas.microsoft.com/office/drawing/2014/main" id="{3CD9DF72-87A3-404E-A828-84CBF11A8303}"/>
               </a:ext>
               <a:ext uri="{C183D7F6-B498-43B3-948B-1728B52AA6E4}">
-                <adec:decorative xmlns="" xmlns:adec="http://schemas.microsoft.com/office/drawing/2017/decorative" val="1"/>
+                <adec:decorative xmlns:adec="http://schemas.microsoft.com/office/drawing/2017/decorative" val="1"/>
               </a:ext>
             </a:extLst>
           </p:cNvPr>
@@ -13309,7 +13068,7 @@
                 <a16:creationId xmlns:a16="http://schemas.microsoft.com/office/drawing/2014/main" id="{20E3A342-4D61-4E3F-AF90-1AB42AEB96CC}"/>
               </a:ext>
               <a:ext uri="{C183D7F6-B498-43B3-948B-1728B52AA6E4}">
-                <adec:decorative xmlns="" xmlns:adec="http://schemas.microsoft.com/office/drawing/2017/decorative" val="1"/>
+                <adec:decorative xmlns:adec="http://schemas.microsoft.com/office/drawing/2017/decorative" val="1"/>
               </a:ext>
             </a:extLst>
           </p:cNvPr>
@@ -13557,7 +13316,7 @@
           <a:p>
             <a:fld id="{2D4C16BC-65FC-460E-B4B6-21D54248088F}" type="datetime1">
               <a:rPr lang="en-US" smtClean="0"/>
-              <a:t>8/28/2018</a:t>
+              <a:t>9/11/2018</a:t>
             </a:fld>
             <a:endParaRPr lang="en-US" dirty="0"/>
           </a:p>

</xml_diff>